<commit_message>
finished chap 5 ppt
</commit_message>
<xml_diff>
--- a/Java SE 8 Teaching Material/Chapter 5 - Working With Java Data Type.pptx
+++ b/Java SE 8 Teaching Material/Chapter 5 - Working With Java Data Type.pptx
@@ -19,6 +19,8 @@
     <p:sldId id="268" r:id="rId13"/>
     <p:sldId id="269" r:id="rId14"/>
     <p:sldId id="271" r:id="rId15"/>
+    <p:sldId id="272" r:id="rId16"/>
+    <p:sldId id="273" r:id="rId17"/>
   </p:sldIdLst>
   <p:sldSz cx="12192000" cy="6858000"/>
   <p:notesSz cx="6858000" cy="9144000"/>
@@ -136,6 +138,8 @@
             <p14:sldId id="268"/>
             <p14:sldId id="269"/>
             <p14:sldId id="271"/>
+            <p14:sldId id="272"/>
+            <p14:sldId id="273"/>
           </p14:sldIdLst>
         </p14:section>
       </p14:sectionLst>
@@ -1678,7 +1682,7 @@
           <a:p>
             <a:fld id="{BAA8DE05-51EE-4692-B197-877FA1DAAAED}" type="datetimeFigureOut">
               <a:rPr lang="en-US" smtClean="0"/>
-              <a:t>8/18/24</a:t>
+              <a:t>8/20/24</a:t>
             </a:fld>
             <a:endParaRPr lang="en-US"/>
           </a:p>
@@ -1876,7 +1880,7 @@
           <a:p>
             <a:fld id="{BAA8DE05-51EE-4692-B197-877FA1DAAAED}" type="datetimeFigureOut">
               <a:rPr lang="en-US" smtClean="0"/>
-              <a:t>8/18/24</a:t>
+              <a:t>8/20/24</a:t>
             </a:fld>
             <a:endParaRPr lang="en-US"/>
           </a:p>
@@ -2084,7 +2088,7 @@
           <a:p>
             <a:fld id="{BAA8DE05-51EE-4692-B197-877FA1DAAAED}" type="datetimeFigureOut">
               <a:rPr lang="en-US" smtClean="0"/>
-              <a:t>8/18/24</a:t>
+              <a:t>8/20/24</a:t>
             </a:fld>
             <a:endParaRPr lang="en-US"/>
           </a:p>
@@ -2282,7 +2286,7 @@
           <a:p>
             <a:fld id="{BAA8DE05-51EE-4692-B197-877FA1DAAAED}" type="datetimeFigureOut">
               <a:rPr lang="en-US" smtClean="0"/>
-              <a:t>8/18/24</a:t>
+              <a:t>8/20/24</a:t>
             </a:fld>
             <a:endParaRPr lang="en-US"/>
           </a:p>
@@ -2557,7 +2561,7 @@
           <a:p>
             <a:fld id="{BAA8DE05-51EE-4692-B197-877FA1DAAAED}" type="datetimeFigureOut">
               <a:rPr lang="en-US" smtClean="0"/>
-              <a:t>8/18/24</a:t>
+              <a:t>8/20/24</a:t>
             </a:fld>
             <a:endParaRPr lang="en-US"/>
           </a:p>
@@ -2822,7 +2826,7 @@
           <a:p>
             <a:fld id="{BAA8DE05-51EE-4692-B197-877FA1DAAAED}" type="datetimeFigureOut">
               <a:rPr lang="en-US" smtClean="0"/>
-              <a:t>8/18/24</a:t>
+              <a:t>8/20/24</a:t>
             </a:fld>
             <a:endParaRPr lang="en-US"/>
           </a:p>
@@ -3234,7 +3238,7 @@
           <a:p>
             <a:fld id="{BAA8DE05-51EE-4692-B197-877FA1DAAAED}" type="datetimeFigureOut">
               <a:rPr lang="en-US" smtClean="0"/>
-              <a:t>8/18/24</a:t>
+              <a:t>8/20/24</a:t>
             </a:fld>
             <a:endParaRPr lang="en-US"/>
           </a:p>
@@ -3375,7 +3379,7 @@
           <a:p>
             <a:fld id="{BAA8DE05-51EE-4692-B197-877FA1DAAAED}" type="datetimeFigureOut">
               <a:rPr lang="en-US" smtClean="0"/>
-              <a:t>8/18/24</a:t>
+              <a:t>8/20/24</a:t>
             </a:fld>
             <a:endParaRPr lang="en-US"/>
           </a:p>
@@ -3488,7 +3492,7 @@
           <a:p>
             <a:fld id="{BAA8DE05-51EE-4692-B197-877FA1DAAAED}" type="datetimeFigureOut">
               <a:rPr lang="en-US" smtClean="0"/>
-              <a:t>8/18/24</a:t>
+              <a:t>8/20/24</a:t>
             </a:fld>
             <a:endParaRPr lang="en-US"/>
           </a:p>
@@ -3799,7 +3803,7 @@
           <a:p>
             <a:fld id="{BAA8DE05-51EE-4692-B197-877FA1DAAAED}" type="datetimeFigureOut">
               <a:rPr lang="en-US" smtClean="0"/>
-              <a:t>8/18/24</a:t>
+              <a:t>8/20/24</a:t>
             </a:fld>
             <a:endParaRPr lang="en-US"/>
           </a:p>
@@ -4087,7 +4091,7 @@
           <a:p>
             <a:fld id="{BAA8DE05-51EE-4692-B197-877FA1DAAAED}" type="datetimeFigureOut">
               <a:rPr lang="en-US" smtClean="0"/>
-              <a:t>8/18/24</a:t>
+              <a:t>8/20/24</a:t>
             </a:fld>
             <a:endParaRPr lang="en-US"/>
           </a:p>
@@ -4328,7 +4332,7 @@
           <a:p>
             <a:fld id="{BAA8DE05-51EE-4692-B197-877FA1DAAAED}" type="datetimeFigureOut">
               <a:rPr lang="en-US" smtClean="0"/>
-              <a:t>8/18/24</a:t>
+              <a:t>8/20/24</a:t>
             </a:fld>
             <a:endParaRPr lang="en-US"/>
           </a:p>
@@ -8463,7 +8467,7 @@
             </a:pPr>
             <a:r>
               <a:rPr lang="en-US" sz="1800" dirty="0"/>
-              <a:t>If the source variable is not a constant =&gt; The compiler will force the developer to promise that the size of the source variable is fit to the target variable. And this promise is called </a:t>
+              <a:t>If the source variable is not a constant =&gt; The compiler will force the developer to promise that the source variable's size fits the target variable. And this promise is called </a:t>
             </a:r>
             <a:r>
               <a:rPr lang="en-US" sz="1800" b="1" dirty="0"/>
@@ -8501,6 +8505,41 @@
               <a:rPr lang="en-US" sz="1800" dirty="0"/>
               <a:t>to assign any primitive integral (byte, char, short, long, int) or floating point value (float, double) to any other integral and floating point value</a:t>
             </a:r>
+          </a:p>
+          <a:p>
+            <a:pPr marL="285750" indent="-285750" algn="l">
+              <a:buFontTx/>
+              <a:buChar char="-"/>
+            </a:pPr>
+            <a:r>
+              <a:rPr lang="en-US" sz="1800" b="1" dirty="0"/>
+              <a:t>Boolean </a:t>
+            </a:r>
+            <a:r>
+              <a:rPr lang="en-US" sz="1800" dirty="0"/>
+              <a:t>value cannot be cast</a:t>
+            </a:r>
+          </a:p>
+          <a:p>
+            <a:pPr marL="285750" indent="-285750" algn="l">
+              <a:buFontTx/>
+              <a:buChar char="-"/>
+            </a:pPr>
+            <a:r>
+              <a:rPr lang="en-US" sz="1800" b="1" dirty="0"/>
+              <a:t>“Casting” </a:t>
+            </a:r>
+            <a:r>
+              <a:rPr lang="en-US" sz="1800" dirty="0"/>
+              <a:t>will tell the compiler that just add the value to the variable and not worry about the spillage</a:t>
+            </a:r>
+          </a:p>
+          <a:p>
+            <a:pPr marL="285750" indent="-285750" algn="l">
+              <a:buFontTx/>
+              <a:buChar char="-"/>
+            </a:pPr>
+            <a:endParaRPr lang="en-US" sz="1800" b="1" dirty="0"/>
           </a:p>
           <a:p>
             <a:pPr marL="285750" indent="-285750" algn="l">
@@ -8687,6 +8726,934 @@
                                           <p:spTgt spid="4">
                                             <p:txEl>
                                               <p:pRg st="2" end="2"/>
+                                            </p:txEl>
+                                          </p:spTgt>
+                                        </p:tgtEl>
+                                        <p:attrNameLst>
+                                          <p:attrName>style.visibility</p:attrName>
+                                        </p:attrNameLst>
+                                      </p:cBhvr>
+                                      <p:to>
+                                        <p:strVal val="visible"/>
+                                      </p:to>
+                                    </p:set>
+                                  </p:childTnLst>
+                                </p:cTn>
+                              </p:par>
+                            </p:childTnLst>
+                          </p:cTn>
+                        </p:par>
+                      </p:childTnLst>
+                    </p:cTn>
+                  </p:par>
+                  <p:par>
+                    <p:cTn id="17" fill="hold">
+                      <p:stCondLst>
+                        <p:cond delay="indefinite"/>
+                      </p:stCondLst>
+                      <p:childTnLst>
+                        <p:par>
+                          <p:cTn id="18" fill="hold">
+                            <p:stCondLst>
+                              <p:cond delay="0"/>
+                            </p:stCondLst>
+                            <p:childTnLst>
+                              <p:par>
+                                <p:cTn id="19" presetID="1" presetClass="entr" presetSubtype="0" fill="hold" nodeType="clickEffect">
+                                  <p:stCondLst>
+                                    <p:cond delay="0"/>
+                                  </p:stCondLst>
+                                  <p:childTnLst>
+                                    <p:set>
+                                      <p:cBhvr>
+                                        <p:cTn id="20" dur="1" fill="hold">
+                                          <p:stCondLst>
+                                            <p:cond delay="0"/>
+                                          </p:stCondLst>
+                                        </p:cTn>
+                                        <p:tgtEl>
+                                          <p:spTgt spid="4">
+                                            <p:txEl>
+                                              <p:pRg st="3" end="3"/>
+                                            </p:txEl>
+                                          </p:spTgt>
+                                        </p:tgtEl>
+                                        <p:attrNameLst>
+                                          <p:attrName>style.visibility</p:attrName>
+                                        </p:attrNameLst>
+                                      </p:cBhvr>
+                                      <p:to>
+                                        <p:strVal val="visible"/>
+                                      </p:to>
+                                    </p:set>
+                                  </p:childTnLst>
+                                </p:cTn>
+                              </p:par>
+                            </p:childTnLst>
+                          </p:cTn>
+                        </p:par>
+                      </p:childTnLst>
+                    </p:cTn>
+                  </p:par>
+                  <p:par>
+                    <p:cTn id="21" fill="hold">
+                      <p:stCondLst>
+                        <p:cond delay="indefinite"/>
+                      </p:stCondLst>
+                      <p:childTnLst>
+                        <p:par>
+                          <p:cTn id="22" fill="hold">
+                            <p:stCondLst>
+                              <p:cond delay="0"/>
+                            </p:stCondLst>
+                            <p:childTnLst>
+                              <p:par>
+                                <p:cTn id="23" presetID="1" presetClass="entr" presetSubtype="0" fill="hold" nodeType="clickEffect">
+                                  <p:stCondLst>
+                                    <p:cond delay="0"/>
+                                  </p:stCondLst>
+                                  <p:childTnLst>
+                                    <p:set>
+                                      <p:cBhvr>
+                                        <p:cTn id="24" dur="1" fill="hold">
+                                          <p:stCondLst>
+                                            <p:cond delay="0"/>
+                                          </p:stCondLst>
+                                        </p:cTn>
+                                        <p:tgtEl>
+                                          <p:spTgt spid="4">
+                                            <p:txEl>
+                                              <p:pRg st="4" end="4"/>
+                                            </p:txEl>
+                                          </p:spTgt>
+                                        </p:tgtEl>
+                                        <p:attrNameLst>
+                                          <p:attrName>style.visibility</p:attrName>
+                                        </p:attrNameLst>
+                                      </p:cBhvr>
+                                      <p:to>
+                                        <p:strVal val="visible"/>
+                                      </p:to>
+                                    </p:set>
+                                  </p:childTnLst>
+                                </p:cTn>
+                              </p:par>
+                            </p:childTnLst>
+                          </p:cTn>
+                        </p:par>
+                      </p:childTnLst>
+                    </p:cTn>
+                  </p:par>
+                </p:childTnLst>
+              </p:cTn>
+              <p:prevCondLst>
+                <p:cond evt="onPrev" delay="0">
+                  <p:tgtEl>
+                    <p:sldTgt/>
+                  </p:tgtEl>
+                </p:cond>
+              </p:prevCondLst>
+              <p:nextCondLst>
+                <p:cond evt="onNext" delay="0">
+                  <p:tgtEl>
+                    <p:sldTgt/>
+                  </p:tgtEl>
+                </p:cond>
+              </p:nextCondLst>
+            </p:seq>
+          </p:childTnLst>
+        </p:cTn>
+      </p:par>
+    </p:tnLst>
+  </p:timing>
+</p:sld>
+</file>
+
+<file path=ppt/slides/slide15.xml><?xml version="1.0" encoding="utf-8"?>
+<p:sld xmlns:a="http://schemas.openxmlformats.org/drawingml/2006/main" xmlns:r="http://schemas.openxmlformats.org/officeDocument/2006/relationships" xmlns:p="http://schemas.openxmlformats.org/presentationml/2006/main">
+  <p:cSld>
+    <p:spTree>
+      <p:nvGrpSpPr>
+        <p:cNvPr id="1" name="">
+          <a:extLst>
+            <a:ext uri="{FF2B5EF4-FFF2-40B4-BE49-F238E27FC236}">
+              <a16:creationId xmlns:a16="http://schemas.microsoft.com/office/drawing/2014/main" id="{A8B61076-BF51-D7A4-8429-13187E25B72F}"/>
+            </a:ext>
+          </a:extLst>
+        </p:cNvPr>
+        <p:cNvGrpSpPr/>
+        <p:nvPr/>
+      </p:nvGrpSpPr>
+      <p:grpSpPr>
+        <a:xfrm>
+          <a:off x="0" y="0"/>
+          <a:ext cx="0" cy="0"/>
+          <a:chOff x="0" y="0"/>
+          <a:chExt cx="0" cy="0"/>
+        </a:xfrm>
+      </p:grpSpPr>
+      <p:sp>
+        <p:nvSpPr>
+          <p:cNvPr id="3" name="Subtitle 2">
+            <a:extLst>
+              <a:ext uri="{FF2B5EF4-FFF2-40B4-BE49-F238E27FC236}">
+                <a16:creationId xmlns:a16="http://schemas.microsoft.com/office/drawing/2014/main" id="{FD664A29-D6EE-3B3A-B3B2-4AA89061A1D1}"/>
+              </a:ext>
+            </a:extLst>
+          </p:cNvPr>
+          <p:cNvSpPr>
+            <a:spLocks noGrp="1"/>
+          </p:cNvSpPr>
+          <p:nvPr>
+            <p:ph type="subTitle" idx="1"/>
+          </p:nvPr>
+        </p:nvSpPr>
+        <p:spPr>
+          <a:xfrm>
+            <a:off x="152399" y="217488"/>
+            <a:ext cx="12039601" cy="303212"/>
+          </a:xfrm>
+        </p:spPr>
+        <p:txBody>
+          <a:bodyPr>
+            <a:normAutofit fontScale="92500" lnSpcReduction="20000"/>
+          </a:bodyPr>
+          <a:lstStyle/>
+          <a:p>
+            <a:r>
+              <a:rPr lang="en-US" sz="1800" b="1" dirty="0"/>
+              <a:t>5.3 Declare and initialize variables </a:t>
+            </a:r>
+            <a:r>
+              <a:rPr lang="en-US" sz="1800" dirty="0"/>
+              <a:t>– 5.3.5 Final variables</a:t>
+            </a:r>
+            <a:endParaRPr lang="en-US" sz="1800" b="1" dirty="0"/>
+          </a:p>
+        </p:txBody>
+      </p:sp>
+      <p:sp>
+        <p:nvSpPr>
+          <p:cNvPr id="4" name="Subtitle 2">
+            <a:extLst>
+              <a:ext uri="{FF2B5EF4-FFF2-40B4-BE49-F238E27FC236}">
+                <a16:creationId xmlns:a16="http://schemas.microsoft.com/office/drawing/2014/main" id="{938F37EF-BE00-4ECA-B5AD-DF3E0AA62357}"/>
+              </a:ext>
+            </a:extLst>
+          </p:cNvPr>
+          <p:cNvSpPr txBox="1">
+            <a:spLocks/>
+          </p:cNvSpPr>
+          <p:nvPr/>
+        </p:nvSpPr>
+        <p:spPr>
+          <a:xfrm>
+            <a:off x="0" y="520700"/>
+            <a:ext cx="12192000" cy="6337300"/>
+          </a:xfrm>
+          <a:prstGeom prst="rect">
+            <a:avLst/>
+          </a:prstGeom>
+        </p:spPr>
+        <p:txBody>
+          <a:bodyPr vert="horz" lIns="91440" tIns="45720" rIns="91440" bIns="45720" rtlCol="0">
+            <a:normAutofit/>
+          </a:bodyPr>
+          <a:lstStyle>
+            <a:lvl1pPr marL="0" indent="0" algn="ctr" defTabSz="914400" rtl="0" eaLnBrk="1" latinLnBrk="0" hangingPunct="1">
+              <a:lnSpc>
+                <a:spcPct val="90000"/>
+              </a:lnSpc>
+              <a:spcBef>
+                <a:spcPts val="1000"/>
+              </a:spcBef>
+              <a:buFont typeface="Arial" panose="020B0604020202020204" pitchFamily="34" charset="0"/>
+              <a:buNone/>
+              <a:defRPr sz="2400" kern="1200">
+                <a:solidFill>
+                  <a:schemeClr val="tx1"/>
+                </a:solidFill>
+                <a:latin typeface="+mn-lt"/>
+                <a:ea typeface="+mn-ea"/>
+                <a:cs typeface="+mn-cs"/>
+              </a:defRPr>
+            </a:lvl1pPr>
+            <a:lvl2pPr marL="457200" indent="0" algn="ctr" defTabSz="914400" rtl="0" eaLnBrk="1" latinLnBrk="0" hangingPunct="1">
+              <a:lnSpc>
+                <a:spcPct val="90000"/>
+              </a:lnSpc>
+              <a:spcBef>
+                <a:spcPts val="500"/>
+              </a:spcBef>
+              <a:buFont typeface="Arial" panose="020B0604020202020204" pitchFamily="34" charset="0"/>
+              <a:buNone/>
+              <a:defRPr sz="2000" kern="1200">
+                <a:solidFill>
+                  <a:schemeClr val="tx1"/>
+                </a:solidFill>
+                <a:latin typeface="+mn-lt"/>
+                <a:ea typeface="+mn-ea"/>
+                <a:cs typeface="+mn-cs"/>
+              </a:defRPr>
+            </a:lvl2pPr>
+            <a:lvl3pPr marL="914400" indent="0" algn="ctr" defTabSz="914400" rtl="0" eaLnBrk="1" latinLnBrk="0" hangingPunct="1">
+              <a:lnSpc>
+                <a:spcPct val="90000"/>
+              </a:lnSpc>
+              <a:spcBef>
+                <a:spcPts val="500"/>
+              </a:spcBef>
+              <a:buFont typeface="Arial" panose="020B0604020202020204" pitchFamily="34" charset="0"/>
+              <a:buNone/>
+              <a:defRPr sz="1800" kern="1200">
+                <a:solidFill>
+                  <a:schemeClr val="tx1"/>
+                </a:solidFill>
+                <a:latin typeface="+mn-lt"/>
+                <a:ea typeface="+mn-ea"/>
+                <a:cs typeface="+mn-cs"/>
+              </a:defRPr>
+            </a:lvl3pPr>
+            <a:lvl4pPr marL="1371600" indent="0" algn="ctr" defTabSz="914400" rtl="0" eaLnBrk="1" latinLnBrk="0" hangingPunct="1">
+              <a:lnSpc>
+                <a:spcPct val="90000"/>
+              </a:lnSpc>
+              <a:spcBef>
+                <a:spcPts val="500"/>
+              </a:spcBef>
+              <a:buFont typeface="Arial" panose="020B0604020202020204" pitchFamily="34" charset="0"/>
+              <a:buNone/>
+              <a:defRPr sz="1600" kern="1200">
+                <a:solidFill>
+                  <a:schemeClr val="tx1"/>
+                </a:solidFill>
+                <a:latin typeface="+mn-lt"/>
+                <a:ea typeface="+mn-ea"/>
+                <a:cs typeface="+mn-cs"/>
+              </a:defRPr>
+            </a:lvl4pPr>
+            <a:lvl5pPr marL="1828800" indent="0" algn="ctr" defTabSz="914400" rtl="0" eaLnBrk="1" latinLnBrk="0" hangingPunct="1">
+              <a:lnSpc>
+                <a:spcPct val="90000"/>
+              </a:lnSpc>
+              <a:spcBef>
+                <a:spcPts val="500"/>
+              </a:spcBef>
+              <a:buFont typeface="Arial" panose="020B0604020202020204" pitchFamily="34" charset="0"/>
+              <a:buNone/>
+              <a:defRPr sz="1600" kern="1200">
+                <a:solidFill>
+                  <a:schemeClr val="tx1"/>
+                </a:solidFill>
+                <a:latin typeface="+mn-lt"/>
+                <a:ea typeface="+mn-ea"/>
+                <a:cs typeface="+mn-cs"/>
+              </a:defRPr>
+            </a:lvl5pPr>
+            <a:lvl6pPr marL="2286000" indent="0" algn="ctr" defTabSz="914400" rtl="0" eaLnBrk="1" latinLnBrk="0" hangingPunct="1">
+              <a:lnSpc>
+                <a:spcPct val="90000"/>
+              </a:lnSpc>
+              <a:spcBef>
+                <a:spcPts val="500"/>
+              </a:spcBef>
+              <a:buFont typeface="Arial" panose="020B0604020202020204" pitchFamily="34" charset="0"/>
+              <a:buNone/>
+              <a:defRPr sz="1600" kern="1200">
+                <a:solidFill>
+                  <a:schemeClr val="tx1"/>
+                </a:solidFill>
+                <a:latin typeface="+mn-lt"/>
+                <a:ea typeface="+mn-ea"/>
+                <a:cs typeface="+mn-cs"/>
+              </a:defRPr>
+            </a:lvl6pPr>
+            <a:lvl7pPr marL="2743200" indent="0" algn="ctr" defTabSz="914400" rtl="0" eaLnBrk="1" latinLnBrk="0" hangingPunct="1">
+              <a:lnSpc>
+                <a:spcPct val="90000"/>
+              </a:lnSpc>
+              <a:spcBef>
+                <a:spcPts val="500"/>
+              </a:spcBef>
+              <a:buFont typeface="Arial" panose="020B0604020202020204" pitchFamily="34" charset="0"/>
+              <a:buNone/>
+              <a:defRPr sz="1600" kern="1200">
+                <a:solidFill>
+                  <a:schemeClr val="tx1"/>
+                </a:solidFill>
+                <a:latin typeface="+mn-lt"/>
+                <a:ea typeface="+mn-ea"/>
+                <a:cs typeface="+mn-cs"/>
+              </a:defRPr>
+            </a:lvl7pPr>
+            <a:lvl8pPr marL="3200400" indent="0" algn="ctr" defTabSz="914400" rtl="0" eaLnBrk="1" latinLnBrk="0" hangingPunct="1">
+              <a:lnSpc>
+                <a:spcPct val="90000"/>
+              </a:lnSpc>
+              <a:spcBef>
+                <a:spcPts val="500"/>
+              </a:spcBef>
+              <a:buFont typeface="Arial" panose="020B0604020202020204" pitchFamily="34" charset="0"/>
+              <a:buNone/>
+              <a:defRPr sz="1600" kern="1200">
+                <a:solidFill>
+                  <a:schemeClr val="tx1"/>
+                </a:solidFill>
+                <a:latin typeface="+mn-lt"/>
+                <a:ea typeface="+mn-ea"/>
+                <a:cs typeface="+mn-cs"/>
+              </a:defRPr>
+            </a:lvl8pPr>
+            <a:lvl9pPr marL="3657600" indent="0" algn="ctr" defTabSz="914400" rtl="0" eaLnBrk="1" latinLnBrk="0" hangingPunct="1">
+              <a:lnSpc>
+                <a:spcPct val="90000"/>
+              </a:lnSpc>
+              <a:spcBef>
+                <a:spcPts val="500"/>
+              </a:spcBef>
+              <a:buFont typeface="Arial" panose="020B0604020202020204" pitchFamily="34" charset="0"/>
+              <a:buNone/>
+              <a:defRPr sz="1600" kern="1200">
+                <a:solidFill>
+                  <a:schemeClr val="tx1"/>
+                </a:solidFill>
+                <a:latin typeface="+mn-lt"/>
+                <a:ea typeface="+mn-ea"/>
+                <a:cs typeface="+mn-cs"/>
+              </a:defRPr>
+            </a:lvl9pPr>
+          </a:lstStyle>
+          <a:p>
+            <a:pPr marL="285750" indent="-285750" algn="l">
+              <a:buFontTx/>
+              <a:buChar char="-"/>
+            </a:pPr>
+            <a:r>
+              <a:rPr lang="en-US" sz="1800" dirty="0"/>
+              <a:t>A </a:t>
+            </a:r>
+            <a:r>
+              <a:rPr lang="en-US" sz="1800" b="1" dirty="0"/>
+              <a:t>“final” </a:t>
+            </a:r>
+            <a:r>
+              <a:rPr lang="en-US" sz="1800" dirty="0"/>
+              <a:t>variable is a type of variable that can’t assign any other values once it has a value assigned to it =&gt; It is a constant </a:t>
+            </a:r>
+            <a:r>
+              <a:rPr lang="en-US" sz="1000" b="1" dirty="0"/>
+              <a:t>(CODE ILLUSTRATION) </a:t>
+            </a:r>
+          </a:p>
+        </p:txBody>
+      </p:sp>
+    </p:spTree>
+    <p:extLst>
+      <p:ext uri="{BB962C8B-B14F-4D97-AF65-F5344CB8AC3E}">
+        <p14:creationId xmlns:p14="http://schemas.microsoft.com/office/powerpoint/2010/main" val="3893926807"/>
+      </p:ext>
+    </p:extLst>
+  </p:cSld>
+  <p:clrMapOvr>
+    <a:masterClrMapping/>
+  </p:clrMapOvr>
+  <p:timing>
+    <p:tnLst>
+      <p:par>
+        <p:cTn id="1" dur="indefinite" restart="never" nodeType="tmRoot">
+          <p:childTnLst>
+            <p:seq concurrent="1" nextAc="seek">
+              <p:cTn id="2" dur="indefinite" nodeType="mainSeq">
+                <p:childTnLst>
+                  <p:par>
+                    <p:cTn id="3" fill="hold">
+                      <p:stCondLst>
+                        <p:cond delay="indefinite"/>
+                      </p:stCondLst>
+                      <p:childTnLst>
+                        <p:par>
+                          <p:cTn id="4" fill="hold">
+                            <p:stCondLst>
+                              <p:cond delay="0"/>
+                            </p:stCondLst>
+                            <p:childTnLst>
+                              <p:par>
+                                <p:cTn id="5" presetID="1" presetClass="entr" presetSubtype="0" fill="hold" nodeType="clickEffect">
+                                  <p:stCondLst>
+                                    <p:cond delay="0"/>
+                                  </p:stCondLst>
+                                  <p:childTnLst>
+                                    <p:set>
+                                      <p:cBhvr>
+                                        <p:cTn id="6" dur="1" fill="hold">
+                                          <p:stCondLst>
+                                            <p:cond delay="0"/>
+                                          </p:stCondLst>
+                                        </p:cTn>
+                                        <p:tgtEl>
+                                          <p:spTgt spid="4">
+                                            <p:txEl>
+                                              <p:pRg st="0" end="0"/>
+                                            </p:txEl>
+                                          </p:spTgt>
+                                        </p:tgtEl>
+                                        <p:attrNameLst>
+                                          <p:attrName>style.visibility</p:attrName>
+                                        </p:attrNameLst>
+                                      </p:cBhvr>
+                                      <p:to>
+                                        <p:strVal val="visible"/>
+                                      </p:to>
+                                    </p:set>
+                                  </p:childTnLst>
+                                </p:cTn>
+                              </p:par>
+                            </p:childTnLst>
+                          </p:cTn>
+                        </p:par>
+                      </p:childTnLst>
+                    </p:cTn>
+                  </p:par>
+                  <p:par>
+                    <p:cTn id="7" fill="hold">
+                      <p:stCondLst>
+                        <p:cond delay="indefinite"/>
+                      </p:stCondLst>
+                      <p:childTnLst>
+                        <p:par>
+                          <p:cTn id="8" fill="hold">
+                            <p:stCondLst>
+                              <p:cond delay="0"/>
+                            </p:stCondLst>
+                            <p:childTnLst>
+                              <p:par>
+                                <p:cTn id="9" presetID="1" presetClass="entr" presetSubtype="0" fill="hold" nodeType="clickEffect">
+                                  <p:stCondLst>
+                                    <p:cond delay="0"/>
+                                  </p:stCondLst>
+                                  <p:childTnLst>
+                                    <p:set>
+                                      <p:cBhvr>
+                                        <p:cTn id="10" dur="1" fill="hold">
+                                          <p:stCondLst>
+                                            <p:cond delay="0"/>
+                                          </p:stCondLst>
+                                        </p:cTn>
+                                        <p:tgtEl>
+                                          <p:spTgt spid="4">
+                                            <p:txEl>
+                                              <p:pRg st="0" end="0"/>
+                                            </p:txEl>
+                                          </p:spTgt>
+                                        </p:tgtEl>
+                                        <p:attrNameLst>
+                                          <p:attrName>style.visibility</p:attrName>
+                                        </p:attrNameLst>
+                                      </p:cBhvr>
+                                      <p:to>
+                                        <p:strVal val="visible"/>
+                                      </p:to>
+                                    </p:set>
+                                  </p:childTnLst>
+                                </p:cTn>
+                              </p:par>
+                            </p:childTnLst>
+                          </p:cTn>
+                        </p:par>
+                      </p:childTnLst>
+                    </p:cTn>
+                  </p:par>
+                </p:childTnLst>
+              </p:cTn>
+              <p:prevCondLst>
+                <p:cond evt="onPrev" delay="0">
+                  <p:tgtEl>
+                    <p:sldTgt/>
+                  </p:tgtEl>
+                </p:cond>
+              </p:prevCondLst>
+              <p:nextCondLst>
+                <p:cond evt="onNext" delay="0">
+                  <p:tgtEl>
+                    <p:sldTgt/>
+                  </p:tgtEl>
+                </p:cond>
+              </p:nextCondLst>
+            </p:seq>
+          </p:childTnLst>
+        </p:cTn>
+      </p:par>
+    </p:tnLst>
+  </p:timing>
+</p:sld>
+</file>
+
+<file path=ppt/slides/slide16.xml><?xml version="1.0" encoding="utf-8"?>
+<p:sld xmlns:a="http://schemas.openxmlformats.org/drawingml/2006/main" xmlns:r="http://schemas.openxmlformats.org/officeDocument/2006/relationships" xmlns:p="http://schemas.openxmlformats.org/presentationml/2006/main">
+  <p:cSld>
+    <p:spTree>
+      <p:nvGrpSpPr>
+        <p:cNvPr id="1" name="">
+          <a:extLst>
+            <a:ext uri="{FF2B5EF4-FFF2-40B4-BE49-F238E27FC236}">
+              <a16:creationId xmlns:a16="http://schemas.microsoft.com/office/drawing/2014/main" id="{A570AD24-8D9A-99FC-B0AF-7C03C6018EAC}"/>
+            </a:ext>
+          </a:extLst>
+        </p:cNvPr>
+        <p:cNvGrpSpPr/>
+        <p:nvPr/>
+      </p:nvGrpSpPr>
+      <p:grpSpPr>
+        <a:xfrm>
+          <a:off x="0" y="0"/>
+          <a:ext cx="0" cy="0"/>
+          <a:chOff x="0" y="0"/>
+          <a:chExt cx="0" cy="0"/>
+        </a:xfrm>
+      </p:grpSpPr>
+      <p:sp>
+        <p:nvSpPr>
+          <p:cNvPr id="3" name="Subtitle 2">
+            <a:extLst>
+              <a:ext uri="{FF2B5EF4-FFF2-40B4-BE49-F238E27FC236}">
+                <a16:creationId xmlns:a16="http://schemas.microsoft.com/office/drawing/2014/main" id="{C2723BCC-8D66-AD80-4BA3-D873CB2D92F3}"/>
+              </a:ext>
+            </a:extLst>
+          </p:cNvPr>
+          <p:cNvSpPr>
+            <a:spLocks noGrp="1"/>
+          </p:cNvSpPr>
+          <p:nvPr>
+            <p:ph type="subTitle" idx="1"/>
+          </p:nvPr>
+        </p:nvSpPr>
+        <p:spPr>
+          <a:xfrm>
+            <a:off x="152399" y="217488"/>
+            <a:ext cx="12039601" cy="303212"/>
+          </a:xfrm>
+        </p:spPr>
+        <p:txBody>
+          <a:bodyPr>
+            <a:normAutofit fontScale="92500" lnSpcReduction="20000"/>
+          </a:bodyPr>
+          <a:lstStyle/>
+          <a:p>
+            <a:r>
+              <a:rPr lang="en-US" sz="1800" b="1" dirty="0"/>
+              <a:t>5.4 Declare and instantiate Java objects </a:t>
+            </a:r>
+            <a:r>
+              <a:rPr lang="en-US" sz="1800" dirty="0"/>
+              <a:t>- 5.4.1 Declare and instantiate Java objects</a:t>
+            </a:r>
+            <a:endParaRPr lang="en-US" sz="1800" b="1" dirty="0"/>
+          </a:p>
+        </p:txBody>
+      </p:sp>
+      <p:sp>
+        <p:nvSpPr>
+          <p:cNvPr id="4" name="Subtitle 2">
+            <a:extLst>
+              <a:ext uri="{FF2B5EF4-FFF2-40B4-BE49-F238E27FC236}">
+                <a16:creationId xmlns:a16="http://schemas.microsoft.com/office/drawing/2014/main" id="{BC1A27CB-7F65-E914-6FD8-EB412FA256E3}"/>
+              </a:ext>
+            </a:extLst>
+          </p:cNvPr>
+          <p:cNvSpPr txBox="1">
+            <a:spLocks/>
+          </p:cNvSpPr>
+          <p:nvPr/>
+        </p:nvSpPr>
+        <p:spPr>
+          <a:xfrm>
+            <a:off x="0" y="520700"/>
+            <a:ext cx="12192000" cy="6337300"/>
+          </a:xfrm>
+          <a:prstGeom prst="rect">
+            <a:avLst/>
+          </a:prstGeom>
+        </p:spPr>
+        <p:txBody>
+          <a:bodyPr vert="horz" lIns="91440" tIns="45720" rIns="91440" bIns="45720" rtlCol="0">
+            <a:normAutofit/>
+          </a:bodyPr>
+          <a:lstStyle>
+            <a:lvl1pPr marL="0" indent="0" algn="ctr" defTabSz="914400" rtl="0" eaLnBrk="1" latinLnBrk="0" hangingPunct="1">
+              <a:lnSpc>
+                <a:spcPct val="90000"/>
+              </a:lnSpc>
+              <a:spcBef>
+                <a:spcPts val="1000"/>
+              </a:spcBef>
+              <a:buFont typeface="Arial" panose="020B0604020202020204" pitchFamily="34" charset="0"/>
+              <a:buNone/>
+              <a:defRPr sz="2400" kern="1200">
+                <a:solidFill>
+                  <a:schemeClr val="tx1"/>
+                </a:solidFill>
+                <a:latin typeface="+mn-lt"/>
+                <a:ea typeface="+mn-ea"/>
+                <a:cs typeface="+mn-cs"/>
+              </a:defRPr>
+            </a:lvl1pPr>
+            <a:lvl2pPr marL="457200" indent="0" algn="ctr" defTabSz="914400" rtl="0" eaLnBrk="1" latinLnBrk="0" hangingPunct="1">
+              <a:lnSpc>
+                <a:spcPct val="90000"/>
+              </a:lnSpc>
+              <a:spcBef>
+                <a:spcPts val="500"/>
+              </a:spcBef>
+              <a:buFont typeface="Arial" panose="020B0604020202020204" pitchFamily="34" charset="0"/>
+              <a:buNone/>
+              <a:defRPr sz="2000" kern="1200">
+                <a:solidFill>
+                  <a:schemeClr val="tx1"/>
+                </a:solidFill>
+                <a:latin typeface="+mn-lt"/>
+                <a:ea typeface="+mn-ea"/>
+                <a:cs typeface="+mn-cs"/>
+              </a:defRPr>
+            </a:lvl2pPr>
+            <a:lvl3pPr marL="914400" indent="0" algn="ctr" defTabSz="914400" rtl="0" eaLnBrk="1" latinLnBrk="0" hangingPunct="1">
+              <a:lnSpc>
+                <a:spcPct val="90000"/>
+              </a:lnSpc>
+              <a:spcBef>
+                <a:spcPts val="500"/>
+              </a:spcBef>
+              <a:buFont typeface="Arial" panose="020B0604020202020204" pitchFamily="34" charset="0"/>
+              <a:buNone/>
+              <a:defRPr sz="1800" kern="1200">
+                <a:solidFill>
+                  <a:schemeClr val="tx1"/>
+                </a:solidFill>
+                <a:latin typeface="+mn-lt"/>
+                <a:ea typeface="+mn-ea"/>
+                <a:cs typeface="+mn-cs"/>
+              </a:defRPr>
+            </a:lvl3pPr>
+            <a:lvl4pPr marL="1371600" indent="0" algn="ctr" defTabSz="914400" rtl="0" eaLnBrk="1" latinLnBrk="0" hangingPunct="1">
+              <a:lnSpc>
+                <a:spcPct val="90000"/>
+              </a:lnSpc>
+              <a:spcBef>
+                <a:spcPts val="500"/>
+              </a:spcBef>
+              <a:buFont typeface="Arial" panose="020B0604020202020204" pitchFamily="34" charset="0"/>
+              <a:buNone/>
+              <a:defRPr sz="1600" kern="1200">
+                <a:solidFill>
+                  <a:schemeClr val="tx1"/>
+                </a:solidFill>
+                <a:latin typeface="+mn-lt"/>
+                <a:ea typeface="+mn-ea"/>
+                <a:cs typeface="+mn-cs"/>
+              </a:defRPr>
+            </a:lvl4pPr>
+            <a:lvl5pPr marL="1828800" indent="0" algn="ctr" defTabSz="914400" rtl="0" eaLnBrk="1" latinLnBrk="0" hangingPunct="1">
+              <a:lnSpc>
+                <a:spcPct val="90000"/>
+              </a:lnSpc>
+              <a:spcBef>
+                <a:spcPts val="500"/>
+              </a:spcBef>
+              <a:buFont typeface="Arial" panose="020B0604020202020204" pitchFamily="34" charset="0"/>
+              <a:buNone/>
+              <a:defRPr sz="1600" kern="1200">
+                <a:solidFill>
+                  <a:schemeClr val="tx1"/>
+                </a:solidFill>
+                <a:latin typeface="+mn-lt"/>
+                <a:ea typeface="+mn-ea"/>
+                <a:cs typeface="+mn-cs"/>
+              </a:defRPr>
+            </a:lvl5pPr>
+            <a:lvl6pPr marL="2286000" indent="0" algn="ctr" defTabSz="914400" rtl="0" eaLnBrk="1" latinLnBrk="0" hangingPunct="1">
+              <a:lnSpc>
+                <a:spcPct val="90000"/>
+              </a:lnSpc>
+              <a:spcBef>
+                <a:spcPts val="500"/>
+              </a:spcBef>
+              <a:buFont typeface="Arial" panose="020B0604020202020204" pitchFamily="34" charset="0"/>
+              <a:buNone/>
+              <a:defRPr sz="1600" kern="1200">
+                <a:solidFill>
+                  <a:schemeClr val="tx1"/>
+                </a:solidFill>
+                <a:latin typeface="+mn-lt"/>
+                <a:ea typeface="+mn-ea"/>
+                <a:cs typeface="+mn-cs"/>
+              </a:defRPr>
+            </a:lvl6pPr>
+            <a:lvl7pPr marL="2743200" indent="0" algn="ctr" defTabSz="914400" rtl="0" eaLnBrk="1" latinLnBrk="0" hangingPunct="1">
+              <a:lnSpc>
+                <a:spcPct val="90000"/>
+              </a:lnSpc>
+              <a:spcBef>
+                <a:spcPts val="500"/>
+              </a:spcBef>
+              <a:buFont typeface="Arial" panose="020B0604020202020204" pitchFamily="34" charset="0"/>
+              <a:buNone/>
+              <a:defRPr sz="1600" kern="1200">
+                <a:solidFill>
+                  <a:schemeClr val="tx1"/>
+                </a:solidFill>
+                <a:latin typeface="+mn-lt"/>
+                <a:ea typeface="+mn-ea"/>
+                <a:cs typeface="+mn-cs"/>
+              </a:defRPr>
+            </a:lvl7pPr>
+            <a:lvl8pPr marL="3200400" indent="0" algn="ctr" defTabSz="914400" rtl="0" eaLnBrk="1" latinLnBrk="0" hangingPunct="1">
+              <a:lnSpc>
+                <a:spcPct val="90000"/>
+              </a:lnSpc>
+              <a:spcBef>
+                <a:spcPts val="500"/>
+              </a:spcBef>
+              <a:buFont typeface="Arial" panose="020B0604020202020204" pitchFamily="34" charset="0"/>
+              <a:buNone/>
+              <a:defRPr sz="1600" kern="1200">
+                <a:solidFill>
+                  <a:schemeClr val="tx1"/>
+                </a:solidFill>
+                <a:latin typeface="+mn-lt"/>
+                <a:ea typeface="+mn-ea"/>
+                <a:cs typeface="+mn-cs"/>
+              </a:defRPr>
+            </a:lvl8pPr>
+            <a:lvl9pPr marL="3657600" indent="0" algn="ctr" defTabSz="914400" rtl="0" eaLnBrk="1" latinLnBrk="0" hangingPunct="1">
+              <a:lnSpc>
+                <a:spcPct val="90000"/>
+              </a:lnSpc>
+              <a:spcBef>
+                <a:spcPts val="500"/>
+              </a:spcBef>
+              <a:buFont typeface="Arial" panose="020B0604020202020204" pitchFamily="34" charset="0"/>
+              <a:buNone/>
+              <a:defRPr sz="1600" kern="1200">
+                <a:solidFill>
+                  <a:schemeClr val="tx1"/>
+                </a:solidFill>
+                <a:latin typeface="+mn-lt"/>
+                <a:ea typeface="+mn-ea"/>
+                <a:cs typeface="+mn-cs"/>
+              </a:defRPr>
+            </a:lvl9pPr>
+          </a:lstStyle>
+          <a:p>
+            <a:pPr marL="285750" indent="-285750" algn="l">
+              <a:buFontTx/>
+              <a:buChar char="-"/>
+            </a:pPr>
+            <a:r>
+              <a:rPr lang="en-US" sz="1800" dirty="0"/>
+              <a:t>The reference type name could be the simple class name or FQCN (if you don’t want to import a class or to use multiple classes with the same method name) </a:t>
+            </a:r>
+            <a:r>
+              <a:rPr lang="en-US" sz="1000" b="1" dirty="0"/>
+              <a:t>(CODE ILLUSTRATION)</a:t>
+            </a:r>
+          </a:p>
+        </p:txBody>
+      </p:sp>
+    </p:spTree>
+    <p:extLst>
+      <p:ext uri="{BB962C8B-B14F-4D97-AF65-F5344CB8AC3E}">
+        <p14:creationId xmlns:p14="http://schemas.microsoft.com/office/powerpoint/2010/main" val="1368841201"/>
+      </p:ext>
+    </p:extLst>
+  </p:cSld>
+  <p:clrMapOvr>
+    <a:masterClrMapping/>
+  </p:clrMapOvr>
+  <p:timing>
+    <p:tnLst>
+      <p:par>
+        <p:cTn id="1" dur="indefinite" restart="never" nodeType="tmRoot">
+          <p:childTnLst>
+            <p:seq concurrent="1" nextAc="seek">
+              <p:cTn id="2" dur="indefinite" nodeType="mainSeq">
+                <p:childTnLst>
+                  <p:par>
+                    <p:cTn id="3" fill="hold">
+                      <p:stCondLst>
+                        <p:cond delay="indefinite"/>
+                      </p:stCondLst>
+                      <p:childTnLst>
+                        <p:par>
+                          <p:cTn id="4" fill="hold">
+                            <p:stCondLst>
+                              <p:cond delay="0"/>
+                            </p:stCondLst>
+                            <p:childTnLst>
+                              <p:par>
+                                <p:cTn id="5" presetID="1" presetClass="entr" presetSubtype="0" fill="hold" nodeType="clickEffect">
+                                  <p:stCondLst>
+                                    <p:cond delay="0"/>
+                                  </p:stCondLst>
+                                  <p:childTnLst>
+                                    <p:set>
+                                      <p:cBhvr>
+                                        <p:cTn id="6" dur="1" fill="hold">
+                                          <p:stCondLst>
+                                            <p:cond delay="0"/>
+                                          </p:stCondLst>
+                                        </p:cTn>
+                                        <p:tgtEl>
+                                          <p:spTgt spid="4">
+                                            <p:txEl>
+                                              <p:pRg st="0" end="0"/>
+                                            </p:txEl>
+                                          </p:spTgt>
+                                        </p:tgtEl>
+                                        <p:attrNameLst>
+                                          <p:attrName>style.visibility</p:attrName>
+                                        </p:attrNameLst>
+                                      </p:cBhvr>
+                                      <p:to>
+                                        <p:strVal val="visible"/>
+                                      </p:to>
+                                    </p:set>
+                                  </p:childTnLst>
+                                </p:cTn>
+                              </p:par>
+                            </p:childTnLst>
+                          </p:cTn>
+                        </p:par>
+                      </p:childTnLst>
+                    </p:cTn>
+                  </p:par>
+                  <p:par>
+                    <p:cTn id="7" fill="hold">
+                      <p:stCondLst>
+                        <p:cond delay="indefinite"/>
+                      </p:stCondLst>
+                      <p:childTnLst>
+                        <p:par>
+                          <p:cTn id="8" fill="hold">
+                            <p:stCondLst>
+                              <p:cond delay="0"/>
+                            </p:stCondLst>
+                            <p:childTnLst>
+                              <p:par>
+                                <p:cTn id="9" presetID="1" presetClass="entr" presetSubtype="0" fill="hold" nodeType="clickEffect">
+                                  <p:stCondLst>
+                                    <p:cond delay="0"/>
+                                  </p:stCondLst>
+                                  <p:childTnLst>
+                                    <p:set>
+                                      <p:cBhvr>
+                                        <p:cTn id="10" dur="1" fill="hold">
+                                          <p:stCondLst>
+                                            <p:cond delay="0"/>
+                                          </p:stCondLst>
+                                        </p:cTn>
+                                        <p:tgtEl>
+                                          <p:spTgt spid="4">
+                                            <p:txEl>
+                                              <p:pRg st="0" end="0"/>
                                             </p:txEl>
                                           </p:spTgt>
                                         </p:tgtEl>

</xml_diff>